<commit_message>
Final updates to Crescendo presentation
</commit_message>
<xml_diff>
--- a/pptfiles/CrescendoV2.pptx
+++ b/pptfiles/CrescendoV2.pptx
@@ -7498,7 +7498,7 @@
           <a:p>
             <a:fld id="{C52CA404-BA5F-4263-A878-03452F5C7821}" type="datetimeFigureOut">
               <a:rPr lang="en-US" smtClean="0"/>
-              <a:t>9/27/2024</a:t>
+              <a:t>9/30/2024</a:t>
             </a:fld>
             <a:endParaRPr lang="en-US"/>
           </a:p>
@@ -7917,6 +7917,90 @@
           <a:p>
             <a:fld id="{087148C5-844F-4B24-AF5D-AE4A32FED565}" type="slidenum">
               <a:rPr lang="en-US" smtClean="0"/>
+              <a:t>8</a:t>
+            </a:fld>
+            <a:endParaRPr lang="en-US"/>
+          </a:p>
+        </p:txBody>
+      </p:sp>
+    </p:spTree>
+    <p:extLst>
+      <p:ext uri="{BB962C8B-B14F-4D97-AF65-F5344CB8AC3E}">
+        <p14:creationId xmlns:p14="http://schemas.microsoft.com/office/powerpoint/2010/main" val="3396123139"/>
+      </p:ext>
+    </p:extLst>
+  </p:cSld>
+  <p:clrMapOvr>
+    <a:masterClrMapping/>
+  </p:clrMapOvr>
+</p:notes>
+</file>
+
+<file path=ppt/notesSlides/notesSlide3.xml><?xml version="1.0" encoding="utf-8"?>
+<p:notes xmlns:a="http://schemas.openxmlformats.org/drawingml/2006/main" xmlns:r="http://schemas.openxmlformats.org/officeDocument/2006/relationships" xmlns:p="http://schemas.openxmlformats.org/presentationml/2006/main">
+  <p:cSld>
+    <p:spTree>
+      <p:nvGrpSpPr>
+        <p:cNvPr id="1" name=""/>
+        <p:cNvGrpSpPr/>
+        <p:nvPr/>
+      </p:nvGrpSpPr>
+      <p:grpSpPr>
+        <a:xfrm>
+          <a:off x="0" y="0"/>
+          <a:ext cx="0" cy="0"/>
+          <a:chOff x="0" y="0"/>
+          <a:chExt cx="0" cy="0"/>
+        </a:xfrm>
+      </p:grpSpPr>
+      <p:sp>
+        <p:nvSpPr>
+          <p:cNvPr id="2" name="Slide Image Placeholder 1"/>
+          <p:cNvSpPr>
+            <a:spLocks noGrp="1" noRot="1" noChangeAspect="1"/>
+          </p:cNvSpPr>
+          <p:nvPr>
+            <p:ph type="sldImg"/>
+          </p:nvPr>
+        </p:nvSpPr>
+        <p:spPr/>
+      </p:sp>
+      <p:sp>
+        <p:nvSpPr>
+          <p:cNvPr id="3" name="Notes Placeholder 2"/>
+          <p:cNvSpPr>
+            <a:spLocks noGrp="1"/>
+          </p:cNvSpPr>
+          <p:nvPr>
+            <p:ph type="body" idx="1"/>
+          </p:nvPr>
+        </p:nvSpPr>
+        <p:spPr/>
+        <p:txBody>
+          <a:bodyPr/>
+          <a:lstStyle/>
+          <a:p>
+            <a:endParaRPr lang="en-US" dirty="0"/>
+          </a:p>
+        </p:txBody>
+      </p:sp>
+      <p:sp>
+        <p:nvSpPr>
+          <p:cNvPr id="4" name="Slide Number Placeholder 3"/>
+          <p:cNvSpPr>
+            <a:spLocks noGrp="1"/>
+          </p:cNvSpPr>
+          <p:nvPr>
+            <p:ph type="sldNum" sz="quarter" idx="5"/>
+          </p:nvPr>
+        </p:nvSpPr>
+        <p:spPr/>
+        <p:txBody>
+          <a:bodyPr/>
+          <a:lstStyle/>
+          <a:p>
+            <a:fld id="{087148C5-844F-4B24-AF5D-AE4A32FED565}" type="slidenum">
+              <a:rPr lang="en-US" smtClean="0"/>
               <a:t>9</a:t>
             </a:fld>
             <a:endParaRPr lang="en-US"/>
@@ -7936,7 +8020,7 @@
 </p:notes>
 </file>
 
-<file path=ppt/notesSlides/notesSlide3.xml><?xml version="1.0" encoding="utf-8"?>
+<file path=ppt/notesSlides/notesSlide4.xml><?xml version="1.0" encoding="utf-8"?>
 <p:notes xmlns:a="http://schemas.openxmlformats.org/drawingml/2006/main" xmlns:r="http://schemas.openxmlformats.org/officeDocument/2006/relationships" xmlns:p="http://schemas.openxmlformats.org/presentationml/2006/main">
   <p:cSld>
     <p:spTree>
@@ -8167,7 +8251,7 @@
           <a:p>
             <a:fld id="{1C3BFB82-2031-4677-8DE5-A01013E16957}" type="datetimeFigureOut">
               <a:rPr lang="en-US" smtClean="0"/>
-              <a:t>9/27/2024</a:t>
+              <a:t>9/30/2024</a:t>
             </a:fld>
             <a:endParaRPr lang="en-US"/>
           </a:p>
@@ -8365,7 +8449,7 @@
           <a:p>
             <a:fld id="{1C3BFB82-2031-4677-8DE5-A01013E16957}" type="datetimeFigureOut">
               <a:rPr lang="en-US" smtClean="0"/>
-              <a:t>9/27/2024</a:t>
+              <a:t>9/30/2024</a:t>
             </a:fld>
             <a:endParaRPr lang="en-US"/>
           </a:p>
@@ -8573,7 +8657,7 @@
           <a:p>
             <a:fld id="{1C3BFB82-2031-4677-8DE5-A01013E16957}" type="datetimeFigureOut">
               <a:rPr lang="en-US" smtClean="0"/>
-              <a:t>9/27/2024</a:t>
+              <a:t>9/30/2024</a:t>
             </a:fld>
             <a:endParaRPr lang="en-US"/>
           </a:p>
@@ -8771,7 +8855,7 @@
           <a:p>
             <a:fld id="{1C3BFB82-2031-4677-8DE5-A01013E16957}" type="datetimeFigureOut">
               <a:rPr lang="en-US" smtClean="0"/>
-              <a:t>9/27/2024</a:t>
+              <a:t>9/30/2024</a:t>
             </a:fld>
             <a:endParaRPr lang="en-US"/>
           </a:p>
@@ -9046,7 +9130,7 @@
           <a:p>
             <a:fld id="{1C3BFB82-2031-4677-8DE5-A01013E16957}" type="datetimeFigureOut">
               <a:rPr lang="en-US" smtClean="0"/>
-              <a:t>9/27/2024</a:t>
+              <a:t>9/30/2024</a:t>
             </a:fld>
             <a:endParaRPr lang="en-US"/>
           </a:p>
@@ -9311,7 +9395,7 @@
           <a:p>
             <a:fld id="{1C3BFB82-2031-4677-8DE5-A01013E16957}" type="datetimeFigureOut">
               <a:rPr lang="en-US" smtClean="0"/>
-              <a:t>9/27/2024</a:t>
+              <a:t>9/30/2024</a:t>
             </a:fld>
             <a:endParaRPr lang="en-US"/>
           </a:p>
@@ -9723,7 +9807,7 @@
           <a:p>
             <a:fld id="{1C3BFB82-2031-4677-8DE5-A01013E16957}" type="datetimeFigureOut">
               <a:rPr lang="en-US" smtClean="0"/>
-              <a:t>9/27/2024</a:t>
+              <a:t>9/30/2024</a:t>
             </a:fld>
             <a:endParaRPr lang="en-US"/>
           </a:p>
@@ -9864,7 +9948,7 @@
           <a:p>
             <a:fld id="{1C3BFB82-2031-4677-8DE5-A01013E16957}" type="datetimeFigureOut">
               <a:rPr lang="en-US" smtClean="0"/>
-              <a:t>9/27/2024</a:t>
+              <a:t>9/30/2024</a:t>
             </a:fld>
             <a:endParaRPr lang="en-US"/>
           </a:p>
@@ -9977,7 +10061,7 @@
           <a:p>
             <a:fld id="{1C3BFB82-2031-4677-8DE5-A01013E16957}" type="datetimeFigureOut">
               <a:rPr lang="en-US" smtClean="0"/>
-              <a:t>9/27/2024</a:t>
+              <a:t>9/30/2024</a:t>
             </a:fld>
             <a:endParaRPr lang="en-US"/>
           </a:p>
@@ -10288,7 +10372,7 @@
           <a:p>
             <a:fld id="{1C3BFB82-2031-4677-8DE5-A01013E16957}" type="datetimeFigureOut">
               <a:rPr lang="en-US" smtClean="0"/>
-              <a:t>9/27/2024</a:t>
+              <a:t>9/30/2024</a:t>
             </a:fld>
             <a:endParaRPr lang="en-US"/>
           </a:p>
@@ -10576,7 +10660,7 @@
           <a:p>
             <a:fld id="{1C3BFB82-2031-4677-8DE5-A01013E16957}" type="datetimeFigureOut">
               <a:rPr lang="en-US" smtClean="0"/>
-              <a:t>9/27/2024</a:t>
+              <a:t>9/30/2024</a:t>
             </a:fld>
             <a:endParaRPr lang="en-US"/>
           </a:p>
@@ -10817,7 +10901,7 @@
           <a:p>
             <a:fld id="{1C3BFB82-2031-4677-8DE5-A01013E16957}" type="datetimeFigureOut">
               <a:rPr lang="en-US" smtClean="0"/>
-              <a:t>9/27/2024</a:t>
+              <a:t>9/30/2024</a:t>
             </a:fld>
             <a:endParaRPr lang="en-US"/>
           </a:p>
@@ -15173,7 +15257,7 @@
           <p:nvPr/>
         </p:nvPicPr>
         <p:blipFill>
-          <a:blip r:embed="rId2">
+          <a:blip r:embed="rId3">
             <a:extLst>
               <a:ext uri="{28A0092B-C50C-407E-A947-70E740481C1C}">
                 <a14:useLocalDpi xmlns:a14="http://schemas.microsoft.com/office/drawing/2010/main" val="0"/>
@@ -15773,17 +15857,6 @@
             <a:endParaRPr lang="en-US" sz="2000" dirty="0"/>
           </a:p>
           <a:p>
-            <a:pPr lvl="1"/>
-            <a:r>
-              <a:rPr lang="en-US" sz="2000" dirty="0" err="1"/>
-              <a:t>NoClobber</a:t>
-            </a:r>
-            <a:r>
-              <a:rPr lang="en-US" sz="2000" dirty="0"/>
-              <a:t> option</a:t>
-            </a:r>
-          </a:p>
-          <a:p>
             <a:r>
               <a:rPr lang="en-US" sz="2000" dirty="0"/>
               <a:t>Prepare your module for distribution</a:t>
@@ -15810,18 +15883,6 @@
               <a:rPr lang="en-US" sz="2000" dirty="0"/>
               <a:t>, Compatibility, etc.)</a:t>
             </a:r>
-          </a:p>
-          <a:p>
-            <a:pPr lvl="1"/>
-            <a:r>
-              <a:rPr lang="en-US" sz="2000" dirty="0"/>
-              <a:t>See requirements for </a:t>
-            </a:r>
-            <a:r>
-              <a:rPr lang="en-US" sz="2000" dirty="0" err="1"/>
-              <a:t>PSGallery</a:t>
-            </a:r>
-            <a:endParaRPr lang="en-US" sz="2000" dirty="0"/>
           </a:p>
           <a:p>
             <a:r>

</xml_diff>